<commit_message>
add outline to text
</commit_message>
<xml_diff>
--- a/template.pptx
+++ b/template.pptx
@@ -153,14 +153,29 @@
             <p:ph type="title" hasCustomPrompt="1"/>
           </p:nvPr>
         </p:nvSpPr>
-        <p:spPr/>
+        <p:spPr>
+          <a:ln w="19050">
+            <a:noFill/>
+          </a:ln>
+        </p:spPr>
         <p:txBody>
           <a:bodyPr>
             <a:normAutofit/>
           </a:bodyPr>
           <a:lstStyle>
             <a:lvl1pPr algn="l">
-              <a:defRPr sz="2700"/>
+              <a:defRPr sz="2700">
+                <a:ln w="15875">
+                  <a:solidFill>
+                    <a:schemeClr val="bg2">
+                      <a:lumMod val="10000"/>
+                    </a:schemeClr>
+                  </a:solidFill>
+                </a:ln>
+                <a:solidFill>
+                  <a:schemeClr val="tx1"/>
+                </a:solidFill>
+              </a:defRPr>
             </a:lvl1pPr>
           </a:lstStyle>
           <a:p>
@@ -224,7 +239,15 @@
           </a:bodyPr>
           <a:lstStyle>
             <a:lvl1pPr>
-              <a:defRPr sz="3600"/>
+              <a:defRPr sz="3600">
+                <a:ln w="19050">
+                  <a:solidFill>
+                    <a:schemeClr val="bg2">
+                      <a:lumMod val="10000"/>
+                    </a:schemeClr>
+                  </a:solidFill>
+                </a:ln>
+              </a:defRPr>
             </a:lvl1pPr>
           </a:lstStyle>
           <a:p>

</xml_diff>

<commit_message>
add text shadow on ppt template
</commit_message>
<xml_diff>
--- a/template.pptx
+++ b/template.pptx
@@ -175,6 +175,13 @@
                 <a:solidFill>
                   <a:schemeClr val="tx1"/>
                 </a:solidFill>
+                <a:effectLst>
+                  <a:outerShdw blurRad="38100" dist="38100" dir="2700000" algn="tl">
+                    <a:srgbClr val="000000">
+                      <a:alpha val="43137"/>
+                    </a:srgbClr>
+                  </a:outerShdw>
+                </a:effectLst>
               </a:defRPr>
             </a:lvl1pPr>
           </a:lstStyle>
@@ -197,6 +204,13 @@
   <p:clrMapOvr>
     <a:masterClrMapping/>
   </p:clrMapOvr>
+  <p:timing>
+    <p:tnLst>
+      <p:par>
+        <p:cTn id="1" dur="indefinite" restart="never" nodeType="tmRoot"/>
+      </p:par>
+    </p:tnLst>
+  </p:timing>
 </p:sldLayout>
 </file>
 
@@ -247,6 +261,13 @@
                     </a:schemeClr>
                   </a:solidFill>
                 </a:ln>
+                <a:effectLst>
+                  <a:outerShdw blurRad="38100" dist="38100" dir="2700000" algn="tl">
+                    <a:srgbClr val="000000">
+                      <a:alpha val="43137"/>
+                    </a:srgbClr>
+                  </a:outerShdw>
+                </a:effectLst>
               </a:defRPr>
             </a:lvl1pPr>
           </a:lstStyle>
@@ -268,6 +289,13 @@
   <p:clrMapOvr>
     <a:masterClrMapping/>
   </p:clrMapOvr>
+  <p:timing>
+    <p:tnLst>
+      <p:par>
+        <p:cTn id="1" dur="indefinite" restart="never" nodeType="tmRoot"/>
+      </p:par>
+    </p:tnLst>
+  </p:timing>
 </p:sldLayout>
 </file>
 
@@ -424,7 +452,7 @@
           <a:p>
             <a:fld id="{22D88EAC-A254-45F7-997A-468C1FF9E595}" type="datetimeFigureOut">
               <a:rPr lang="ko-KR" altLang="en-US" smtClean="0"/>
-              <a:t>2022-12-24</a:t>
+              <a:t>2023-03-19</a:t>
             </a:fld>
             <a:endParaRPr lang="ko-KR" altLang="en-US"/>
           </a:p>
@@ -520,6 +548,13 @@
     <p:sldLayoutId id="2147483651" r:id="rId1"/>
     <p:sldLayoutId id="2147483654" r:id="rId2"/>
   </p:sldLayoutIdLst>
+  <p:timing>
+    <p:tnLst>
+      <p:par>
+        <p:cTn id="1" dur="indefinite" restart="never" nodeType="tmRoot"/>
+      </p:par>
+    </p:tnLst>
+  </p:timing>
   <p:txStyles>
     <p:titleStyle>
       <a:lvl1pPr algn="ctr" defTabSz="342900" rtl="0" eaLnBrk="1" latinLnBrk="0" hangingPunct="1">

</xml_diff>